<commit_message>
3. Setting up the project structuring and importing BrrowserRouter Updating the project plan what is ging to run on the client and server
</commit_message>
<xml_diff>
--- a/Project Plan.pptx
+++ b/Project Plan.pptx
@@ -6,6 +6,7 @@
   </p:sldMasterIdLst>
   <p:sldIdLst>
     <p:sldId id="256" r:id="rId2"/>
+    <p:sldId id="257" r:id="rId3"/>
   </p:sldIdLst>
   <p:sldSz cx="12192000" cy="6858000"/>
   <p:notesSz cx="6858000" cy="9144000"/>
@@ -104,6 +105,11 @@
       </a:defRPr>
     </a:lvl9pPr>
   </p:defaultTextStyle>
+  <p:extLst>
+    <p:ext uri="{EFAFB233-063F-42B5-8137-9DF3F51BA10A}">
+      <p15:sldGuideLst xmlns:p15="http://schemas.microsoft.com/office/powerpoint/2012/main"/>
+    </p:ext>
+  </p:extLst>
 </p:presentation>
 </file>
 
@@ -4609,6 +4615,799 @@
 </p:sld>
 </file>
 
+<file path=ppt/slides/slide2.xml><?xml version="1.0" encoding="utf-8"?>
+<p:sld xmlns:a="http://schemas.openxmlformats.org/drawingml/2006/main" xmlns:r="http://schemas.openxmlformats.org/officeDocument/2006/relationships" xmlns:p="http://schemas.openxmlformats.org/presentationml/2006/main">
+  <p:cSld>
+    <p:spTree>
+      <p:nvGrpSpPr>
+        <p:cNvPr id="1" name=""/>
+        <p:cNvGrpSpPr/>
+        <p:nvPr/>
+      </p:nvGrpSpPr>
+      <p:grpSpPr>
+        <a:xfrm>
+          <a:off x="0" y="0"/>
+          <a:ext cx="0" cy="0"/>
+          <a:chOff x="0" y="0"/>
+          <a:chExt cx="0" cy="0"/>
+        </a:xfrm>
+      </p:grpSpPr>
+      <p:sp>
+        <p:nvSpPr>
+          <p:cNvPr id="3" name="Content Placeholder 2">
+            <a:extLst>
+              <a:ext uri="{FF2B5EF4-FFF2-40B4-BE49-F238E27FC236}">
+                <a16:creationId xmlns:a16="http://schemas.microsoft.com/office/drawing/2014/main" id="{5AA025C6-E3B5-4908-8234-6A55BB242660}"/>
+              </a:ext>
+            </a:extLst>
+          </p:cNvPr>
+          <p:cNvSpPr>
+            <a:spLocks noGrp="1"/>
+          </p:cNvSpPr>
+          <p:nvPr>
+            <p:ph idx="1"/>
+          </p:nvPr>
+        </p:nvSpPr>
+        <p:spPr>
+          <a:xfrm>
+            <a:off x="457200" y="336884"/>
+            <a:ext cx="10896600" cy="6184232"/>
+          </a:xfrm>
+        </p:spPr>
+        <p:txBody>
+          <a:bodyPr/>
+          <a:lstStyle/>
+          <a:p>
+            <a:endParaRPr lang="en-CA" dirty="0"/>
+          </a:p>
+        </p:txBody>
+      </p:sp>
+      <p:sp>
+        <p:nvSpPr>
+          <p:cNvPr id="4" name="Rectangle 3">
+            <a:extLst>
+              <a:ext uri="{FF2B5EF4-FFF2-40B4-BE49-F238E27FC236}">
+                <a16:creationId xmlns:a16="http://schemas.microsoft.com/office/drawing/2014/main" id="{2C7EDDA4-1078-4391-AA71-CA26DB851AB2}"/>
+              </a:ext>
+            </a:extLst>
+          </p:cNvPr>
+          <p:cNvSpPr/>
+          <p:nvPr/>
+        </p:nvSpPr>
+        <p:spPr>
+          <a:xfrm>
+            <a:off x="862283" y="2983832"/>
+            <a:ext cx="2502568" cy="986589"/>
+          </a:xfrm>
+          <a:prstGeom prst="rect">
+            <a:avLst/>
+          </a:prstGeom>
+        </p:spPr>
+        <p:style>
+          <a:lnRef idx="2">
+            <a:schemeClr val="accent1">
+              <a:shade val="50000"/>
+            </a:schemeClr>
+          </a:lnRef>
+          <a:fillRef idx="1">
+            <a:schemeClr val="accent1"/>
+          </a:fillRef>
+          <a:effectRef idx="0">
+            <a:schemeClr val="accent1"/>
+          </a:effectRef>
+          <a:fontRef idx="minor">
+            <a:schemeClr val="lt1"/>
+          </a:fontRef>
+        </p:style>
+        <p:txBody>
+          <a:bodyPr rtlCol="0" anchor="ctr"/>
+          <a:lstStyle/>
+          <a:p>
+            <a:pPr algn="ctr"/>
+            <a:r>
+              <a:rPr lang="en-IN" dirty="0"/>
+              <a:t>React App</a:t>
+            </a:r>
+            <a:endParaRPr lang="en-CA" dirty="0"/>
+          </a:p>
+        </p:txBody>
+      </p:sp>
+      <p:sp>
+        <p:nvSpPr>
+          <p:cNvPr id="5" name="Rectangle 4">
+            <a:extLst>
+              <a:ext uri="{FF2B5EF4-FFF2-40B4-BE49-F238E27FC236}">
+                <a16:creationId xmlns:a16="http://schemas.microsoft.com/office/drawing/2014/main" id="{FBEA35F7-892F-4AEA-9187-20D7AF273A9B}"/>
+              </a:ext>
+            </a:extLst>
+          </p:cNvPr>
+          <p:cNvSpPr/>
+          <p:nvPr/>
+        </p:nvSpPr>
+        <p:spPr>
+          <a:xfrm>
+            <a:off x="5419570" y="3217888"/>
+            <a:ext cx="1352860" cy="422224"/>
+          </a:xfrm>
+          <a:prstGeom prst="rect">
+            <a:avLst/>
+          </a:prstGeom>
+        </p:spPr>
+        <p:style>
+          <a:lnRef idx="2">
+            <a:schemeClr val="accent6"/>
+          </a:lnRef>
+          <a:fillRef idx="1">
+            <a:schemeClr val="lt1"/>
+          </a:fillRef>
+          <a:effectRef idx="0">
+            <a:schemeClr val="accent6"/>
+          </a:effectRef>
+          <a:fontRef idx="minor">
+            <a:schemeClr val="dk1"/>
+          </a:fontRef>
+        </p:style>
+        <p:txBody>
+          <a:bodyPr rot="0" spcFirstLastPara="0" vert="horz" wrap="square" lIns="91440" tIns="45720" rIns="91440" bIns="45720" numCol="1" spcCol="0" rtlCol="0" fromWordArt="0" anchor="ctr" anchorCtr="0" forceAA="0" compatLnSpc="1">
+            <a:prstTxWarp prst="textNoShape">
+              <a:avLst/>
+            </a:prstTxWarp>
+            <a:noAutofit/>
+          </a:bodyPr>
+          <a:lstStyle>
+            <a:defPPr>
+              <a:defRPr lang="en-US"/>
+            </a:defPPr>
+            <a:lvl1pPr marL="0" algn="l" defTabSz="914400" rtl="0" eaLnBrk="1" latinLnBrk="0" hangingPunct="1">
+              <a:defRPr sz="1800" kern="1200">
+                <a:solidFill>
+                  <a:schemeClr val="dk1"/>
+                </a:solidFill>
+                <a:latin typeface="+mn-lt"/>
+                <a:ea typeface="+mn-ea"/>
+                <a:cs typeface="+mn-cs"/>
+              </a:defRPr>
+            </a:lvl1pPr>
+            <a:lvl2pPr marL="457200" algn="l" defTabSz="914400" rtl="0" eaLnBrk="1" latinLnBrk="0" hangingPunct="1">
+              <a:defRPr sz="1800" kern="1200">
+                <a:solidFill>
+                  <a:schemeClr val="dk1"/>
+                </a:solidFill>
+                <a:latin typeface="+mn-lt"/>
+                <a:ea typeface="+mn-ea"/>
+                <a:cs typeface="+mn-cs"/>
+              </a:defRPr>
+            </a:lvl2pPr>
+            <a:lvl3pPr marL="914400" algn="l" defTabSz="914400" rtl="0" eaLnBrk="1" latinLnBrk="0" hangingPunct="1">
+              <a:defRPr sz="1800" kern="1200">
+                <a:solidFill>
+                  <a:schemeClr val="dk1"/>
+                </a:solidFill>
+                <a:latin typeface="+mn-lt"/>
+                <a:ea typeface="+mn-ea"/>
+                <a:cs typeface="+mn-cs"/>
+              </a:defRPr>
+            </a:lvl3pPr>
+            <a:lvl4pPr marL="1371600" algn="l" defTabSz="914400" rtl="0" eaLnBrk="1" latinLnBrk="0" hangingPunct="1">
+              <a:defRPr sz="1800" kern="1200">
+                <a:solidFill>
+                  <a:schemeClr val="dk1"/>
+                </a:solidFill>
+                <a:latin typeface="+mn-lt"/>
+                <a:ea typeface="+mn-ea"/>
+                <a:cs typeface="+mn-cs"/>
+              </a:defRPr>
+            </a:lvl4pPr>
+            <a:lvl5pPr marL="1828800" algn="l" defTabSz="914400" rtl="0" eaLnBrk="1" latinLnBrk="0" hangingPunct="1">
+              <a:defRPr sz="1800" kern="1200">
+                <a:solidFill>
+                  <a:schemeClr val="dk1"/>
+                </a:solidFill>
+                <a:latin typeface="+mn-lt"/>
+                <a:ea typeface="+mn-ea"/>
+                <a:cs typeface="+mn-cs"/>
+              </a:defRPr>
+            </a:lvl5pPr>
+            <a:lvl6pPr marL="2286000" algn="l" defTabSz="914400" rtl="0" eaLnBrk="1" latinLnBrk="0" hangingPunct="1">
+              <a:defRPr sz="1800" kern="1200">
+                <a:solidFill>
+                  <a:schemeClr val="dk1"/>
+                </a:solidFill>
+                <a:latin typeface="+mn-lt"/>
+                <a:ea typeface="+mn-ea"/>
+                <a:cs typeface="+mn-cs"/>
+              </a:defRPr>
+            </a:lvl6pPr>
+            <a:lvl7pPr marL="2743200" algn="l" defTabSz="914400" rtl="0" eaLnBrk="1" latinLnBrk="0" hangingPunct="1">
+              <a:defRPr sz="1800" kern="1200">
+                <a:solidFill>
+                  <a:schemeClr val="dk1"/>
+                </a:solidFill>
+                <a:latin typeface="+mn-lt"/>
+                <a:ea typeface="+mn-ea"/>
+                <a:cs typeface="+mn-cs"/>
+              </a:defRPr>
+            </a:lvl7pPr>
+            <a:lvl8pPr marL="3200400" algn="l" defTabSz="914400" rtl="0" eaLnBrk="1" latinLnBrk="0" hangingPunct="1">
+              <a:defRPr sz="1800" kern="1200">
+                <a:solidFill>
+                  <a:schemeClr val="dk1"/>
+                </a:solidFill>
+                <a:latin typeface="+mn-lt"/>
+                <a:ea typeface="+mn-ea"/>
+                <a:cs typeface="+mn-cs"/>
+              </a:defRPr>
+            </a:lvl8pPr>
+            <a:lvl9pPr marL="3657600" algn="l" defTabSz="914400" rtl="0" eaLnBrk="1" latinLnBrk="0" hangingPunct="1">
+              <a:defRPr sz="1800" kern="1200">
+                <a:solidFill>
+                  <a:schemeClr val="dk1"/>
+                </a:solidFill>
+                <a:latin typeface="+mn-lt"/>
+                <a:ea typeface="+mn-ea"/>
+                <a:cs typeface="+mn-cs"/>
+              </a:defRPr>
+            </a:lvl9pPr>
+          </a:lstStyle>
+          <a:p>
+            <a:pPr algn="ctr"/>
+            <a:endParaRPr lang="en-CA"/>
+          </a:p>
+        </p:txBody>
+      </p:sp>
+      <p:sp>
+        <p:nvSpPr>
+          <p:cNvPr id="6" name="Rectangle 5">
+            <a:extLst>
+              <a:ext uri="{FF2B5EF4-FFF2-40B4-BE49-F238E27FC236}">
+                <a16:creationId xmlns:a16="http://schemas.microsoft.com/office/drawing/2014/main" id="{D435589C-EA88-4C40-B2AA-9976B61AAF38}"/>
+              </a:ext>
+            </a:extLst>
+          </p:cNvPr>
+          <p:cNvSpPr/>
+          <p:nvPr/>
+        </p:nvSpPr>
+        <p:spPr>
+          <a:xfrm>
+            <a:off x="4168286" y="2983832"/>
+            <a:ext cx="2502568" cy="986589"/>
+          </a:xfrm>
+          <a:prstGeom prst="rect">
+            <a:avLst/>
+          </a:prstGeom>
+        </p:spPr>
+        <p:style>
+          <a:lnRef idx="2">
+            <a:schemeClr val="accent1">
+              <a:shade val="50000"/>
+            </a:schemeClr>
+          </a:lnRef>
+          <a:fillRef idx="1">
+            <a:schemeClr val="accent1"/>
+          </a:fillRef>
+          <a:effectRef idx="0">
+            <a:schemeClr val="accent1"/>
+          </a:effectRef>
+          <a:fontRef idx="minor">
+            <a:schemeClr val="lt1"/>
+          </a:fontRef>
+        </p:style>
+        <p:txBody>
+          <a:bodyPr rtlCol="0" anchor="ctr"/>
+          <a:lstStyle/>
+          <a:p>
+            <a:pPr algn="ctr"/>
+            <a:r>
+              <a:rPr lang="en-IN" dirty="0"/>
+              <a:t>Redux</a:t>
+            </a:r>
+            <a:endParaRPr lang="en-CA" dirty="0"/>
+          </a:p>
+        </p:txBody>
+      </p:sp>
+      <p:sp>
+        <p:nvSpPr>
+          <p:cNvPr id="7" name="Rectangle 6">
+            <a:extLst>
+              <a:ext uri="{FF2B5EF4-FFF2-40B4-BE49-F238E27FC236}">
+                <a16:creationId xmlns:a16="http://schemas.microsoft.com/office/drawing/2014/main" id="{F4106FC1-A9D1-4AD7-9B44-42ECD309CA22}"/>
+              </a:ext>
+            </a:extLst>
+          </p:cNvPr>
+          <p:cNvSpPr/>
+          <p:nvPr/>
+        </p:nvSpPr>
+        <p:spPr>
+          <a:xfrm>
+            <a:off x="8261684" y="1138990"/>
+            <a:ext cx="2502568" cy="986589"/>
+          </a:xfrm>
+          <a:prstGeom prst="rect">
+            <a:avLst/>
+          </a:prstGeom>
+        </p:spPr>
+        <p:style>
+          <a:lnRef idx="2">
+            <a:schemeClr val="accent1">
+              <a:shade val="50000"/>
+            </a:schemeClr>
+          </a:lnRef>
+          <a:fillRef idx="1">
+            <a:schemeClr val="accent1"/>
+          </a:fillRef>
+          <a:effectRef idx="0">
+            <a:schemeClr val="accent1"/>
+          </a:effectRef>
+          <a:fontRef idx="minor">
+            <a:schemeClr val="lt1"/>
+          </a:fontRef>
+        </p:style>
+        <p:txBody>
+          <a:bodyPr rtlCol="0" anchor="ctr"/>
+          <a:lstStyle/>
+          <a:p>
+            <a:pPr algn="ctr"/>
+            <a:r>
+              <a:rPr lang="en-IN" dirty="0" err="1"/>
+              <a:t>Firestore</a:t>
+            </a:r>
+            <a:r>
+              <a:rPr lang="en-IN" dirty="0"/>
+              <a:t> </a:t>
+            </a:r>
+            <a:r>
+              <a:rPr lang="en-IN" dirty="0" err="1"/>
+              <a:t>db</a:t>
+            </a:r>
+            <a:endParaRPr lang="en-CA" dirty="0"/>
+          </a:p>
+        </p:txBody>
+      </p:sp>
+      <p:sp>
+        <p:nvSpPr>
+          <p:cNvPr id="8" name="Rectangle 7">
+            <a:extLst>
+              <a:ext uri="{FF2B5EF4-FFF2-40B4-BE49-F238E27FC236}">
+                <a16:creationId xmlns:a16="http://schemas.microsoft.com/office/drawing/2014/main" id="{7712365A-C6DF-466D-80E2-CCC424539BC6}"/>
+              </a:ext>
+            </a:extLst>
+          </p:cNvPr>
+          <p:cNvSpPr/>
+          <p:nvPr/>
+        </p:nvSpPr>
+        <p:spPr>
+          <a:xfrm>
+            <a:off x="8261684" y="2653523"/>
+            <a:ext cx="2502568" cy="986589"/>
+          </a:xfrm>
+          <a:prstGeom prst="rect">
+            <a:avLst/>
+          </a:prstGeom>
+        </p:spPr>
+        <p:style>
+          <a:lnRef idx="2">
+            <a:schemeClr val="accent1">
+              <a:shade val="50000"/>
+            </a:schemeClr>
+          </a:lnRef>
+          <a:fillRef idx="1">
+            <a:schemeClr val="accent1"/>
+          </a:fillRef>
+          <a:effectRef idx="0">
+            <a:schemeClr val="accent1"/>
+          </a:effectRef>
+          <a:fontRef idx="minor">
+            <a:schemeClr val="lt1"/>
+          </a:fontRef>
+        </p:style>
+        <p:txBody>
+          <a:bodyPr rtlCol="0" anchor="ctr"/>
+          <a:lstStyle/>
+          <a:p>
+            <a:pPr algn="ctr"/>
+            <a:r>
+              <a:rPr lang="en-IN" dirty="0"/>
+              <a:t>Firebase Auth</a:t>
+            </a:r>
+            <a:endParaRPr lang="en-CA" dirty="0"/>
+          </a:p>
+        </p:txBody>
+      </p:sp>
+      <p:sp>
+        <p:nvSpPr>
+          <p:cNvPr id="9" name="Rectangle 8">
+            <a:extLst>
+              <a:ext uri="{FF2B5EF4-FFF2-40B4-BE49-F238E27FC236}">
+                <a16:creationId xmlns:a16="http://schemas.microsoft.com/office/drawing/2014/main" id="{987D56C4-7EA0-409E-AC0B-A477C7C5B2D1}"/>
+              </a:ext>
+            </a:extLst>
+          </p:cNvPr>
+          <p:cNvSpPr/>
+          <p:nvPr/>
+        </p:nvSpPr>
+        <p:spPr>
+          <a:xfrm>
+            <a:off x="8238952" y="4240245"/>
+            <a:ext cx="2502568" cy="986589"/>
+          </a:xfrm>
+          <a:prstGeom prst="rect">
+            <a:avLst/>
+          </a:prstGeom>
+        </p:spPr>
+        <p:style>
+          <a:lnRef idx="2">
+            <a:schemeClr val="accent1">
+              <a:shade val="50000"/>
+            </a:schemeClr>
+          </a:lnRef>
+          <a:fillRef idx="1">
+            <a:schemeClr val="accent1"/>
+          </a:fillRef>
+          <a:effectRef idx="0">
+            <a:schemeClr val="accent1"/>
+          </a:effectRef>
+          <a:fontRef idx="minor">
+            <a:schemeClr val="lt1"/>
+          </a:fontRef>
+        </p:style>
+        <p:txBody>
+          <a:bodyPr rtlCol="0" anchor="ctr"/>
+          <a:lstStyle/>
+          <a:p>
+            <a:pPr algn="ctr"/>
+            <a:r>
+              <a:rPr lang="en-IN"/>
+              <a:t>Cloud Function</a:t>
+            </a:r>
+            <a:endParaRPr lang="en-CA"/>
+          </a:p>
+        </p:txBody>
+      </p:sp>
+      <p:cxnSp>
+        <p:nvCxnSpPr>
+          <p:cNvPr id="11" name="Straight Connector 10">
+            <a:extLst>
+              <a:ext uri="{FF2B5EF4-FFF2-40B4-BE49-F238E27FC236}">
+                <a16:creationId xmlns:a16="http://schemas.microsoft.com/office/drawing/2014/main" id="{EA43A816-A7A8-4D68-9E0A-926B8390695B}"/>
+              </a:ext>
+            </a:extLst>
+          </p:cNvPr>
+          <p:cNvCxnSpPr/>
+          <p:nvPr/>
+        </p:nvCxnSpPr>
+        <p:spPr>
+          <a:xfrm>
+            <a:off x="7411453" y="1138990"/>
+            <a:ext cx="0" cy="5382126"/>
+          </a:xfrm>
+          <a:prstGeom prst="line">
+            <a:avLst/>
+          </a:prstGeom>
+        </p:spPr>
+        <p:style>
+          <a:lnRef idx="1">
+            <a:schemeClr val="dk1"/>
+          </a:lnRef>
+          <a:fillRef idx="0">
+            <a:schemeClr val="dk1"/>
+          </a:fillRef>
+          <a:effectRef idx="0">
+            <a:schemeClr val="dk1"/>
+          </a:effectRef>
+          <a:fontRef idx="minor">
+            <a:schemeClr val="tx1"/>
+          </a:fontRef>
+        </p:style>
+      </p:cxnSp>
+      <p:cxnSp>
+        <p:nvCxnSpPr>
+          <p:cNvPr id="14" name="Straight Connector 13">
+            <a:extLst>
+              <a:ext uri="{FF2B5EF4-FFF2-40B4-BE49-F238E27FC236}">
+                <a16:creationId xmlns:a16="http://schemas.microsoft.com/office/drawing/2014/main" id="{5EA37D6C-646B-4180-A93F-EB86727EEFB2}"/>
+              </a:ext>
+            </a:extLst>
+          </p:cNvPr>
+          <p:cNvCxnSpPr>
+            <a:cxnSpLocks/>
+          </p:cNvCxnSpPr>
+          <p:nvPr/>
+        </p:nvCxnSpPr>
+        <p:spPr>
+          <a:xfrm>
+            <a:off x="3364851" y="3477126"/>
+            <a:ext cx="1038707" cy="0"/>
+          </a:xfrm>
+          <a:prstGeom prst="line">
+            <a:avLst/>
+          </a:prstGeom>
+        </p:spPr>
+        <p:style>
+          <a:lnRef idx="1">
+            <a:schemeClr val="dk1"/>
+          </a:lnRef>
+          <a:fillRef idx="0">
+            <a:schemeClr val="dk1"/>
+          </a:fillRef>
+          <a:effectRef idx="0">
+            <a:schemeClr val="dk1"/>
+          </a:effectRef>
+          <a:fontRef idx="minor">
+            <a:schemeClr val="tx1"/>
+          </a:fontRef>
+        </p:style>
+      </p:cxnSp>
+      <p:cxnSp>
+        <p:nvCxnSpPr>
+          <p:cNvPr id="17" name="Straight Connector 16">
+            <a:extLst>
+              <a:ext uri="{FF2B5EF4-FFF2-40B4-BE49-F238E27FC236}">
+                <a16:creationId xmlns:a16="http://schemas.microsoft.com/office/drawing/2014/main" id="{80E87008-9D15-4822-8C66-969511CF2973}"/>
+              </a:ext>
+            </a:extLst>
+          </p:cNvPr>
+          <p:cNvCxnSpPr>
+            <a:cxnSpLocks/>
+          </p:cNvCxnSpPr>
+          <p:nvPr/>
+        </p:nvCxnSpPr>
+        <p:spPr>
+          <a:xfrm>
+            <a:off x="6670854" y="3515785"/>
+            <a:ext cx="1590830" cy="0"/>
+          </a:xfrm>
+          <a:prstGeom prst="line">
+            <a:avLst/>
+          </a:prstGeom>
+        </p:spPr>
+        <p:style>
+          <a:lnRef idx="1">
+            <a:schemeClr val="dk1"/>
+          </a:lnRef>
+          <a:fillRef idx="0">
+            <a:schemeClr val="dk1"/>
+          </a:fillRef>
+          <a:effectRef idx="0">
+            <a:schemeClr val="dk1"/>
+          </a:effectRef>
+          <a:fontRef idx="minor">
+            <a:schemeClr val="tx1"/>
+          </a:fontRef>
+        </p:style>
+      </p:cxnSp>
+      <p:cxnSp>
+        <p:nvCxnSpPr>
+          <p:cNvPr id="19" name="Straight Connector 18">
+            <a:extLst>
+              <a:ext uri="{FF2B5EF4-FFF2-40B4-BE49-F238E27FC236}">
+                <a16:creationId xmlns:a16="http://schemas.microsoft.com/office/drawing/2014/main" id="{C475A39A-8927-4649-9B1D-4C0FDD522978}"/>
+              </a:ext>
+            </a:extLst>
+          </p:cNvPr>
+          <p:cNvCxnSpPr>
+            <a:cxnSpLocks/>
+          </p:cNvCxnSpPr>
+          <p:nvPr/>
+        </p:nvCxnSpPr>
+        <p:spPr>
+          <a:xfrm>
+            <a:off x="7748337" y="1632284"/>
+            <a:ext cx="513347" cy="0"/>
+          </a:xfrm>
+          <a:prstGeom prst="line">
+            <a:avLst/>
+          </a:prstGeom>
+        </p:spPr>
+        <p:style>
+          <a:lnRef idx="1">
+            <a:schemeClr val="dk1"/>
+          </a:lnRef>
+          <a:fillRef idx="0">
+            <a:schemeClr val="dk1"/>
+          </a:fillRef>
+          <a:effectRef idx="0">
+            <a:schemeClr val="dk1"/>
+          </a:effectRef>
+          <a:fontRef idx="minor">
+            <a:schemeClr val="tx1"/>
+          </a:fontRef>
+        </p:style>
+      </p:cxnSp>
+      <p:cxnSp>
+        <p:nvCxnSpPr>
+          <p:cNvPr id="22" name="Straight Connector 21">
+            <a:extLst>
+              <a:ext uri="{FF2B5EF4-FFF2-40B4-BE49-F238E27FC236}">
+                <a16:creationId xmlns:a16="http://schemas.microsoft.com/office/drawing/2014/main" id="{01D01B58-A10A-4346-A95D-C2171BC177F7}"/>
+              </a:ext>
+            </a:extLst>
+          </p:cNvPr>
+          <p:cNvCxnSpPr>
+            <a:cxnSpLocks/>
+          </p:cNvCxnSpPr>
+          <p:nvPr/>
+        </p:nvCxnSpPr>
+        <p:spPr>
+          <a:xfrm>
+            <a:off x="7748337" y="4777654"/>
+            <a:ext cx="490615" cy="0"/>
+          </a:xfrm>
+          <a:prstGeom prst="line">
+            <a:avLst/>
+          </a:prstGeom>
+        </p:spPr>
+        <p:style>
+          <a:lnRef idx="1">
+            <a:schemeClr val="dk1"/>
+          </a:lnRef>
+          <a:fillRef idx="0">
+            <a:schemeClr val="dk1"/>
+          </a:fillRef>
+          <a:effectRef idx="0">
+            <a:schemeClr val="dk1"/>
+          </a:effectRef>
+          <a:fontRef idx="minor">
+            <a:schemeClr val="tx1"/>
+          </a:fontRef>
+        </p:style>
+      </p:cxnSp>
+      <p:cxnSp>
+        <p:nvCxnSpPr>
+          <p:cNvPr id="24" name="Straight Connector 23">
+            <a:extLst>
+              <a:ext uri="{FF2B5EF4-FFF2-40B4-BE49-F238E27FC236}">
+                <a16:creationId xmlns:a16="http://schemas.microsoft.com/office/drawing/2014/main" id="{BB8C6DB0-7555-4E7A-8B6A-93E1A3B2AFF2}"/>
+              </a:ext>
+            </a:extLst>
+          </p:cNvPr>
+          <p:cNvCxnSpPr>
+            <a:cxnSpLocks/>
+          </p:cNvCxnSpPr>
+          <p:nvPr/>
+        </p:nvCxnSpPr>
+        <p:spPr>
+          <a:xfrm>
+            <a:off x="7748338" y="1632284"/>
+            <a:ext cx="40106" cy="3140243"/>
+          </a:xfrm>
+          <a:prstGeom prst="line">
+            <a:avLst/>
+          </a:prstGeom>
+        </p:spPr>
+        <p:style>
+          <a:lnRef idx="1">
+            <a:schemeClr val="dk1"/>
+          </a:lnRef>
+          <a:fillRef idx="0">
+            <a:schemeClr val="dk1"/>
+          </a:fillRef>
+          <a:effectRef idx="0">
+            <a:schemeClr val="dk1"/>
+          </a:effectRef>
+          <a:fontRef idx="minor">
+            <a:schemeClr val="tx1"/>
+          </a:fontRef>
+        </p:style>
+      </p:cxnSp>
+      <p:sp>
+        <p:nvSpPr>
+          <p:cNvPr id="27" name="Rectangle 26">
+            <a:extLst>
+              <a:ext uri="{FF2B5EF4-FFF2-40B4-BE49-F238E27FC236}">
+                <a16:creationId xmlns:a16="http://schemas.microsoft.com/office/drawing/2014/main" id="{529E625C-7285-4EA7-BC53-881997DBFE64}"/>
+              </a:ext>
+            </a:extLst>
+          </p:cNvPr>
+          <p:cNvSpPr/>
+          <p:nvPr/>
+        </p:nvSpPr>
+        <p:spPr>
+          <a:xfrm>
+            <a:off x="7908758" y="451078"/>
+            <a:ext cx="2855494" cy="668493"/>
+          </a:xfrm>
+          <a:prstGeom prst="rect">
+            <a:avLst/>
+          </a:prstGeom>
+          <a:ln>
+            <a:solidFill>
+              <a:schemeClr val="bg1"/>
+            </a:solidFill>
+          </a:ln>
+        </p:spPr>
+        <p:style>
+          <a:lnRef idx="2">
+            <a:schemeClr val="accent6"/>
+          </a:lnRef>
+          <a:fillRef idx="1">
+            <a:schemeClr val="lt1"/>
+          </a:fillRef>
+          <a:effectRef idx="0">
+            <a:schemeClr val="accent6"/>
+          </a:effectRef>
+          <a:fontRef idx="minor">
+            <a:schemeClr val="dk1"/>
+          </a:fontRef>
+        </p:style>
+        <p:txBody>
+          <a:bodyPr rtlCol="0" anchor="ctr"/>
+          <a:lstStyle/>
+          <a:p>
+            <a:pPr algn="ctr"/>
+            <a:r>
+              <a:rPr lang="en-IN" dirty="0"/>
+              <a:t>Server/ Firebase</a:t>
+            </a:r>
+            <a:endParaRPr lang="en-CA" dirty="0"/>
+          </a:p>
+        </p:txBody>
+      </p:sp>
+      <p:sp>
+        <p:nvSpPr>
+          <p:cNvPr id="30" name="Rectangle 29">
+            <a:extLst>
+              <a:ext uri="{FF2B5EF4-FFF2-40B4-BE49-F238E27FC236}">
+                <a16:creationId xmlns:a16="http://schemas.microsoft.com/office/drawing/2014/main" id="{0A0AC2B4-5C37-44FA-A0B4-7E4A4DA07AE6}"/>
+              </a:ext>
+            </a:extLst>
+          </p:cNvPr>
+          <p:cNvSpPr/>
+          <p:nvPr/>
+        </p:nvSpPr>
+        <p:spPr>
+          <a:xfrm>
+            <a:off x="2077453" y="1291390"/>
+            <a:ext cx="2855494" cy="986572"/>
+          </a:xfrm>
+          <a:prstGeom prst="rect">
+            <a:avLst/>
+          </a:prstGeom>
+          <a:ln>
+            <a:solidFill>
+              <a:schemeClr val="bg1"/>
+            </a:solidFill>
+          </a:ln>
+        </p:spPr>
+        <p:style>
+          <a:lnRef idx="2">
+            <a:schemeClr val="accent6"/>
+          </a:lnRef>
+          <a:fillRef idx="1">
+            <a:schemeClr val="lt1"/>
+          </a:fillRef>
+          <a:effectRef idx="0">
+            <a:schemeClr val="accent6"/>
+          </a:effectRef>
+          <a:fontRef idx="minor">
+            <a:schemeClr val="dk1"/>
+          </a:fontRef>
+        </p:style>
+        <p:txBody>
+          <a:bodyPr rtlCol="0" anchor="ctr"/>
+          <a:lstStyle/>
+          <a:p>
+            <a:pPr algn="ctr"/>
+            <a:r>
+              <a:rPr lang="en-IN" dirty="0"/>
+              <a:t>Client/Browser</a:t>
+            </a:r>
+            <a:endParaRPr lang="en-CA" dirty="0"/>
+          </a:p>
+        </p:txBody>
+      </p:sp>
+    </p:spTree>
+    <p:extLst>
+      <p:ext uri="{BB962C8B-B14F-4D97-AF65-F5344CB8AC3E}">
+        <p14:creationId xmlns:p14="http://schemas.microsoft.com/office/powerpoint/2010/main" val="2725675614"/>
+      </p:ext>
+    </p:extLst>
+  </p:cSld>
+  <p:clrMapOvr>
+    <a:masterClrMapping/>
+  </p:clrMapOvr>
+</p:sld>
+</file>
+
 <file path=ppt/theme/theme1.xml><?xml version="1.0" encoding="utf-8"?>
 <a:theme xmlns:a="http://schemas.openxmlformats.org/drawingml/2006/main" name="Office Theme">
   <a:themeElements>

</xml_diff>